<commit_message>
add slides pdf and edit readme
</commit_message>
<xml_diff>
--- a/AD_classifier.pptx
+++ b/AD_classifier.pptx
@@ -5,7 +5,7 @@
     <p:sldMasterId id="2147483696" r:id="rId1"/>
   </p:sldMasterIdLst>
   <p:notesMasterIdLst>
-    <p:notesMasterId r:id="rId17"/>
+    <p:notesMasterId r:id="rId18"/>
   </p:notesMasterIdLst>
   <p:sldIdLst>
     <p:sldId id="263" r:id="rId2"/>
@@ -22,7 +22,8 @@
     <p:sldId id="266" r:id="rId13"/>
     <p:sldId id="267" r:id="rId14"/>
     <p:sldId id="275" r:id="rId15"/>
-    <p:sldId id="270" r:id="rId16"/>
+    <p:sldId id="276" r:id="rId16"/>
+    <p:sldId id="270" r:id="rId17"/>
   </p:sldIdLst>
   <p:sldSz cx="12192000" cy="6858000"/>
   <p:notesSz cx="6858000" cy="9144000"/>
@@ -170,6 +171,7 @@
           </a:p>
         </c:rich>
       </c:tx>
+      <c:layout/>
       <c:overlay val="0"/>
       <c:spPr>
         <a:noFill/>
@@ -270,6 +272,7 @@
             <c:showLeaderLines val="0"/>
             <c:extLst>
               <c:ext xmlns:c15="http://schemas.microsoft.com/office/drawing/2012/chart" uri="{CE6537A1-D6FC-4f65-9D91-7224C49458BB}">
+                <c15:layout/>
                 <c15:showLeaderLines val="1"/>
                 <c15:leaderLines>
                   <c:spPr>
@@ -381,6 +384,7 @@
             <c:showLeaderLines val="0"/>
             <c:extLst>
               <c:ext xmlns:c15="http://schemas.microsoft.com/office/drawing/2012/chart" uri="{CE6537A1-D6FC-4f65-9D91-7224C49458BB}">
+                <c15:layout/>
                 <c15:showLeaderLines val="1"/>
                 <c15:leaderLines>
                   <c:spPr>
@@ -492,6 +496,7 @@
             <c:showLeaderLines val="0"/>
             <c:extLst>
               <c:ext xmlns:c15="http://schemas.microsoft.com/office/drawing/2012/chart" uri="{CE6537A1-D6FC-4f65-9D91-7224C49458BB}">
+                <c15:layout/>
                 <c15:showLeaderLines val="1"/>
                 <c15:leaderLines>
                   <c:spPr>
@@ -618,6 +623,7 @@
               </a:p>
             </c:rich>
           </c:tx>
+          <c:layout/>
           <c:overlay val="0"/>
           <c:spPr>
             <a:noFill/>
@@ -803,6 +809,7 @@
           </a:p>
         </c:rich>
       </c:tx>
+      <c:layout/>
       <c:overlay val="0"/>
       <c:spPr>
         <a:noFill/>
@@ -913,6 +920,7 @@
             <c:showLeaderLines val="0"/>
             <c:extLst>
               <c:ext xmlns:c15="http://schemas.microsoft.com/office/drawing/2012/chart" uri="{CE6537A1-D6FC-4f65-9D91-7224C49458BB}">
+                <c15:layout/>
                 <c15:showLeaderLines val="1"/>
                 <c15:leaderLines>
                   <c:spPr>
@@ -1024,6 +1032,7 @@
             <c:showLeaderLines val="0"/>
             <c:extLst>
               <c:ext xmlns:c15="http://schemas.microsoft.com/office/drawing/2012/chart" uri="{CE6537A1-D6FC-4f65-9D91-7224C49458BB}">
+                <c15:layout/>
                 <c15:showLeaderLines val="1"/>
                 <c15:leaderLines>
                   <c:spPr>
@@ -1135,6 +1144,7 @@
             <c:showLeaderLines val="0"/>
             <c:extLst>
               <c:ext xmlns:c15="http://schemas.microsoft.com/office/drawing/2012/chart" uri="{CE6537A1-D6FC-4f65-9D91-7224C49458BB}">
+                <c15:layout/>
                 <c15:showLeaderLines val="1"/>
                 <c15:leaderLines>
                   <c:spPr>
@@ -1260,6 +1270,7 @@
               </a:p>
             </c:rich>
           </c:tx>
+          <c:layout/>
           <c:overlay val="0"/>
           <c:spPr>
             <a:noFill/>
@@ -1334,6 +1345,7 @@
     </c:plotArea>
     <c:legend>
       <c:legendPos val="b"/>
+      <c:layout/>
       <c:overlay val="0"/>
       <c:spPr>
         <a:noFill/>
@@ -1431,6 +1443,7 @@
           </a:p>
         </c:rich>
       </c:tx>
+      <c:layout/>
       <c:overlay val="0"/>
       <c:spPr>
         <a:noFill/>
@@ -1541,6 +1554,7 @@
             <c:showLeaderLines val="0"/>
             <c:extLst>
               <c:ext xmlns:c15="http://schemas.microsoft.com/office/drawing/2012/chart" uri="{CE6537A1-D6FC-4f65-9D91-7224C49458BB}">
+                <c15:layout/>
                 <c15:showLeaderLines val="1"/>
                 <c15:leaderLines>
                   <c:spPr>
@@ -1652,6 +1666,7 @@
             <c:showLeaderLines val="0"/>
             <c:extLst>
               <c:ext xmlns:c15="http://schemas.microsoft.com/office/drawing/2012/chart" uri="{CE6537A1-D6FC-4f65-9D91-7224C49458BB}">
+                <c15:layout/>
                 <c15:showLeaderLines val="1"/>
                 <c15:leaderLines>
                   <c:spPr>
@@ -1777,6 +1792,7 @@
               </a:p>
             </c:rich>
           </c:tx>
+          <c:layout/>
           <c:overlay val="0"/>
           <c:spPr>
             <a:noFill/>
@@ -1851,6 +1867,7 @@
     </c:plotArea>
     <c:legend>
       <c:legendPos val="b"/>
+      <c:layout/>
       <c:overlay val="0"/>
       <c:spPr>
         <a:noFill/>
@@ -10860,6 +10877,1071 @@
           <a:bodyPr/>
           <a:lstStyle/>
           <a:p>
+            <a:fld id="{717C4B98-A51E-4049-8774-1A461F0E67F1}" type="datetime1">
+              <a:rPr lang="en-US" altLang="zh-TW" smtClean="0"/>
+              <a:t>8/4/2021</a:t>
+            </a:fld>
+            <a:endParaRPr lang="en-US" dirty="0"/>
+          </a:p>
+        </p:txBody>
+      </p:sp>
+      <p:sp>
+        <p:nvSpPr>
+          <p:cNvPr id="5" name="投影片編號版面配置區 4"/>
+          <p:cNvSpPr>
+            <a:spLocks noGrp="1"/>
+          </p:cNvSpPr>
+          <p:nvPr>
+            <p:ph type="sldNum" sz="quarter" idx="12"/>
+          </p:nvPr>
+        </p:nvSpPr>
+        <p:spPr/>
+        <p:txBody>
+          <a:bodyPr/>
+          <a:lstStyle/>
+          <a:p>
+            <a:fld id="{8A7A6979-0714-4377-B894-6BE4C2D6E202}" type="slidenum">
+              <a:rPr lang="en-US" smtClean="0"/>
+              <a:pPr/>
+              <a:t>15</a:t>
+            </a:fld>
+            <a:endParaRPr lang="en-US" dirty="0"/>
+          </a:p>
+        </p:txBody>
+      </p:sp>
+      <p:grpSp>
+        <p:nvGrpSpPr>
+          <p:cNvPr id="6" name="群組 5"/>
+          <p:cNvGrpSpPr/>
+          <p:nvPr/>
+        </p:nvGrpSpPr>
+        <p:grpSpPr>
+          <a:xfrm>
+            <a:off x="822960" y="157941"/>
+            <a:ext cx="10523913" cy="5968538"/>
+            <a:chOff x="822960" y="157941"/>
+            <a:chExt cx="10523913" cy="5968538"/>
+          </a:xfrm>
+        </p:grpSpPr>
+        <p:grpSp>
+          <p:nvGrpSpPr>
+            <p:cNvPr id="7" name="群組 6"/>
+            <p:cNvGrpSpPr/>
+            <p:nvPr/>
+          </p:nvGrpSpPr>
+          <p:grpSpPr>
+            <a:xfrm>
+              <a:off x="3857105" y="157941"/>
+              <a:ext cx="7290259" cy="369332"/>
+              <a:chOff x="2992582" y="648392"/>
+              <a:chExt cx="7290259" cy="369332"/>
+            </a:xfrm>
+          </p:grpSpPr>
+          <p:sp>
+            <p:nvSpPr>
+              <p:cNvPr id="23" name="文字方塊 22"/>
+              <p:cNvSpPr txBox="1"/>
+              <p:nvPr/>
+            </p:nvSpPr>
+            <p:spPr>
+              <a:xfrm>
+                <a:off x="2992582" y="648392"/>
+                <a:ext cx="773083" cy="369332"/>
+              </a:xfrm>
+              <a:prstGeom prst="rect">
+                <a:avLst/>
+              </a:prstGeom>
+              <a:noFill/>
+            </p:spPr>
+            <p:txBody>
+              <a:bodyPr wrap="square" rtlCol="0">
+                <a:spAutoFit/>
+              </a:bodyPr>
+              <a:lstStyle/>
+              <a:p>
+                <a:r>
+                  <a:rPr lang="en-US" altLang="zh-TW" dirty="0" smtClean="0"/>
+                  <a:t>Jul  22</a:t>
+                </a:r>
+                <a:endParaRPr lang="zh-TW" altLang="en-US" dirty="0"/>
+              </a:p>
+            </p:txBody>
+          </p:sp>
+          <p:sp>
+            <p:nvSpPr>
+              <p:cNvPr id="24" name="文字方塊 23"/>
+              <p:cNvSpPr txBox="1"/>
+              <p:nvPr/>
+            </p:nvSpPr>
+            <p:spPr>
+              <a:xfrm>
+                <a:off x="4621876" y="648392"/>
+                <a:ext cx="773083" cy="369332"/>
+              </a:xfrm>
+              <a:prstGeom prst="rect">
+                <a:avLst/>
+              </a:prstGeom>
+              <a:noFill/>
+            </p:spPr>
+            <p:txBody>
+              <a:bodyPr wrap="square" rtlCol="0">
+                <a:spAutoFit/>
+              </a:bodyPr>
+              <a:lstStyle/>
+              <a:p>
+                <a:r>
+                  <a:rPr lang="en-US" altLang="zh-TW" dirty="0" smtClean="0"/>
+                  <a:t>Jul  23</a:t>
+                </a:r>
+                <a:endParaRPr lang="zh-TW" altLang="en-US" dirty="0"/>
+              </a:p>
+            </p:txBody>
+          </p:sp>
+          <p:sp>
+            <p:nvSpPr>
+              <p:cNvPr id="25" name="文字方塊 24"/>
+              <p:cNvSpPr txBox="1"/>
+              <p:nvPr/>
+            </p:nvSpPr>
+            <p:spPr>
+              <a:xfrm>
+                <a:off x="6251170" y="648392"/>
+                <a:ext cx="773083" cy="369332"/>
+              </a:xfrm>
+              <a:prstGeom prst="rect">
+                <a:avLst/>
+              </a:prstGeom>
+              <a:noFill/>
+            </p:spPr>
+            <p:txBody>
+              <a:bodyPr wrap="square" rtlCol="0">
+                <a:spAutoFit/>
+              </a:bodyPr>
+              <a:lstStyle/>
+              <a:p>
+                <a:r>
+                  <a:rPr lang="en-US" altLang="zh-TW" dirty="0" smtClean="0"/>
+                  <a:t>Jul  24</a:t>
+                </a:r>
+                <a:endParaRPr lang="zh-TW" altLang="en-US" dirty="0"/>
+              </a:p>
+            </p:txBody>
+          </p:sp>
+          <p:sp>
+            <p:nvSpPr>
+              <p:cNvPr id="26" name="文字方塊 25"/>
+              <p:cNvSpPr txBox="1"/>
+              <p:nvPr/>
+            </p:nvSpPr>
+            <p:spPr>
+              <a:xfrm>
+                <a:off x="7880464" y="648392"/>
+                <a:ext cx="773083" cy="369332"/>
+              </a:xfrm>
+              <a:prstGeom prst="rect">
+                <a:avLst/>
+              </a:prstGeom>
+              <a:noFill/>
+            </p:spPr>
+            <p:txBody>
+              <a:bodyPr wrap="square" rtlCol="0">
+                <a:spAutoFit/>
+              </a:bodyPr>
+              <a:lstStyle/>
+              <a:p>
+                <a:r>
+                  <a:rPr lang="en-US" altLang="zh-TW" dirty="0" smtClean="0"/>
+                  <a:t>Jul  25</a:t>
+                </a:r>
+                <a:endParaRPr lang="zh-TW" altLang="en-US" dirty="0"/>
+              </a:p>
+            </p:txBody>
+          </p:sp>
+          <p:sp>
+            <p:nvSpPr>
+              <p:cNvPr id="27" name="文字方塊 26"/>
+              <p:cNvSpPr txBox="1"/>
+              <p:nvPr/>
+            </p:nvSpPr>
+            <p:spPr>
+              <a:xfrm>
+                <a:off x="9509758" y="648392"/>
+                <a:ext cx="773083" cy="369332"/>
+              </a:xfrm>
+              <a:prstGeom prst="rect">
+                <a:avLst/>
+              </a:prstGeom>
+              <a:noFill/>
+            </p:spPr>
+            <p:txBody>
+              <a:bodyPr wrap="square" rtlCol="0">
+                <a:spAutoFit/>
+              </a:bodyPr>
+              <a:lstStyle/>
+              <a:p>
+                <a:r>
+                  <a:rPr lang="en-US" altLang="zh-TW" dirty="0" smtClean="0"/>
+                  <a:t>Jul  26</a:t>
+                </a:r>
+                <a:endParaRPr lang="zh-TW" altLang="en-US" dirty="0"/>
+              </a:p>
+            </p:txBody>
+          </p:sp>
+        </p:grpSp>
+        <p:sp>
+          <p:nvSpPr>
+            <p:cNvPr id="8" name="矩形 7"/>
+            <p:cNvSpPr/>
+            <p:nvPr/>
+          </p:nvSpPr>
+          <p:spPr>
+            <a:xfrm>
+              <a:off x="822960" y="814646"/>
+              <a:ext cx="2028305" cy="2443943"/>
+            </a:xfrm>
+            <a:prstGeom prst="rect">
+              <a:avLst/>
+            </a:prstGeom>
+          </p:spPr>
+          <p:style>
+            <a:lnRef idx="2">
+              <a:schemeClr val="accent1">
+                <a:shade val="50000"/>
+              </a:schemeClr>
+            </a:lnRef>
+            <a:fillRef idx="1">
+              <a:schemeClr val="accent1"/>
+            </a:fillRef>
+            <a:effectRef idx="0">
+              <a:schemeClr val="accent1"/>
+            </a:effectRef>
+            <a:fontRef idx="minor">
+              <a:schemeClr val="lt1"/>
+            </a:fontRef>
+          </p:style>
+          <p:txBody>
+            <a:bodyPr rtlCol="0" anchor="ctr"/>
+            <a:lstStyle/>
+            <a:p>
+              <a:pPr algn="ctr"/>
+              <a:r>
+                <a:rPr lang="en-US" altLang="zh-TW" sz="2000" dirty="0" smtClean="0"/>
+                <a:t>Classifier</a:t>
+              </a:r>
+              <a:endParaRPr lang="zh-TW" altLang="en-US" sz="2000" dirty="0"/>
+            </a:p>
+          </p:txBody>
+        </p:sp>
+        <p:sp>
+          <p:nvSpPr>
+            <p:cNvPr id="9" name="矩形 8"/>
+            <p:cNvSpPr/>
+            <p:nvPr/>
+          </p:nvSpPr>
+          <p:spPr>
+            <a:xfrm>
+              <a:off x="822960" y="3541221"/>
+              <a:ext cx="2028305" cy="1163781"/>
+            </a:xfrm>
+            <a:prstGeom prst="rect">
+              <a:avLst/>
+            </a:prstGeom>
+          </p:spPr>
+          <p:style>
+            <a:lnRef idx="2">
+              <a:schemeClr val="accent2">
+                <a:shade val="50000"/>
+              </a:schemeClr>
+            </a:lnRef>
+            <a:fillRef idx="1">
+              <a:schemeClr val="accent2"/>
+            </a:fillRef>
+            <a:effectRef idx="0">
+              <a:schemeClr val="accent2"/>
+            </a:effectRef>
+            <a:fontRef idx="minor">
+              <a:schemeClr val="lt1"/>
+            </a:fontRef>
+          </p:style>
+          <p:txBody>
+            <a:bodyPr rtlCol="0" anchor="ctr"/>
+            <a:lstStyle/>
+            <a:p>
+              <a:pPr algn="ctr"/>
+              <a:r>
+                <a:rPr lang="en-US" altLang="zh-TW" sz="2000" dirty="0" smtClean="0"/>
+                <a:t>CLI app</a:t>
+              </a:r>
+              <a:endParaRPr lang="zh-TW" altLang="en-US" sz="2000" dirty="0"/>
+            </a:p>
+          </p:txBody>
+        </p:sp>
+        <p:sp>
+          <p:nvSpPr>
+            <p:cNvPr id="10" name="矩形 9"/>
+            <p:cNvSpPr/>
+            <p:nvPr/>
+          </p:nvSpPr>
+          <p:spPr>
+            <a:xfrm>
+              <a:off x="822960" y="4971010"/>
+              <a:ext cx="2028305" cy="1155469"/>
+            </a:xfrm>
+            <a:prstGeom prst="rect">
+              <a:avLst/>
+            </a:prstGeom>
+          </p:spPr>
+          <p:style>
+            <a:lnRef idx="2">
+              <a:schemeClr val="accent4">
+                <a:shade val="50000"/>
+              </a:schemeClr>
+            </a:lnRef>
+            <a:fillRef idx="1">
+              <a:schemeClr val="accent4"/>
+            </a:fillRef>
+            <a:effectRef idx="0">
+              <a:schemeClr val="accent4"/>
+            </a:effectRef>
+            <a:fontRef idx="minor">
+              <a:schemeClr val="lt1"/>
+            </a:fontRef>
+          </p:style>
+          <p:txBody>
+            <a:bodyPr rtlCol="0" anchor="ctr"/>
+            <a:lstStyle/>
+            <a:p>
+              <a:pPr algn="ctr"/>
+              <a:r>
+                <a:rPr lang="en-US" altLang="zh-TW" sz="2000" dirty="0" smtClean="0"/>
+                <a:t>WEB</a:t>
+              </a:r>
+              <a:r>
+                <a:rPr lang="zh-TW" altLang="en-US" sz="2000" dirty="0" smtClean="0"/>
+                <a:t> </a:t>
+              </a:r>
+              <a:r>
+                <a:rPr lang="en-US" altLang="zh-TW" sz="2000" dirty="0" smtClean="0"/>
+                <a:t>app</a:t>
+              </a:r>
+              <a:endParaRPr lang="zh-TW" altLang="en-US" sz="2000" dirty="0"/>
+            </a:p>
+          </p:txBody>
+        </p:sp>
+        <p:sp>
+          <p:nvSpPr>
+            <p:cNvPr id="11" name="圓角矩形 10"/>
+            <p:cNvSpPr/>
+            <p:nvPr/>
+          </p:nvSpPr>
+          <p:spPr>
+            <a:xfrm>
+              <a:off x="3325091" y="814647"/>
+              <a:ext cx="1853738" cy="257695"/>
+            </a:xfrm>
+            <a:prstGeom prst="roundRect">
+              <a:avLst/>
+            </a:prstGeom>
+            <a:solidFill>
+              <a:schemeClr val="accent1">
+                <a:lumMod val="60000"/>
+                <a:lumOff val="40000"/>
+              </a:schemeClr>
+            </a:solidFill>
+            <a:ln>
+              <a:noFill/>
+            </a:ln>
+          </p:spPr>
+          <p:style>
+            <a:lnRef idx="2">
+              <a:schemeClr val="accent1">
+                <a:shade val="50000"/>
+              </a:schemeClr>
+            </a:lnRef>
+            <a:fillRef idx="1">
+              <a:schemeClr val="accent1"/>
+            </a:fillRef>
+            <a:effectRef idx="0">
+              <a:schemeClr val="accent1"/>
+            </a:effectRef>
+            <a:fontRef idx="minor">
+              <a:schemeClr val="lt1"/>
+            </a:fontRef>
+          </p:style>
+          <p:txBody>
+            <a:bodyPr rtlCol="0" anchor="ctr"/>
+            <a:lstStyle/>
+            <a:p>
+              <a:pPr algn="ctr"/>
+              <a:r>
+                <a:rPr lang="en-US" altLang="zh-TW" dirty="0"/>
+                <a:t>s</a:t>
+              </a:r>
+              <a:r>
+                <a:rPr lang="en-US" altLang="zh-TW" dirty="0" smtClean="0"/>
+                <a:t>crap data</a:t>
+              </a:r>
+              <a:endParaRPr lang="zh-TW" altLang="en-US" dirty="0"/>
+            </a:p>
+          </p:txBody>
+        </p:sp>
+        <p:sp>
+          <p:nvSpPr>
+            <p:cNvPr id="12" name="圓角矩形 11"/>
+            <p:cNvSpPr/>
+            <p:nvPr/>
+          </p:nvSpPr>
+          <p:spPr>
+            <a:xfrm>
+              <a:off x="3325091" y="1230868"/>
+              <a:ext cx="1853738" cy="257695"/>
+            </a:xfrm>
+            <a:prstGeom prst="roundRect">
+              <a:avLst/>
+            </a:prstGeom>
+            <a:solidFill>
+              <a:schemeClr val="accent1">
+                <a:lumMod val="60000"/>
+                <a:lumOff val="40000"/>
+              </a:schemeClr>
+            </a:solidFill>
+            <a:ln>
+              <a:noFill/>
+            </a:ln>
+          </p:spPr>
+          <p:style>
+            <a:lnRef idx="2">
+              <a:schemeClr val="accent1">
+                <a:shade val="50000"/>
+              </a:schemeClr>
+            </a:lnRef>
+            <a:fillRef idx="1">
+              <a:schemeClr val="accent1"/>
+            </a:fillRef>
+            <a:effectRef idx="0">
+              <a:schemeClr val="accent1"/>
+            </a:effectRef>
+            <a:fontRef idx="minor">
+              <a:schemeClr val="lt1"/>
+            </a:fontRef>
+          </p:style>
+          <p:txBody>
+            <a:bodyPr rtlCol="0" anchor="ctr"/>
+            <a:lstStyle/>
+            <a:p>
+              <a:pPr algn="ctr"/>
+              <a:r>
+                <a:rPr lang="en-US" altLang="zh-TW" dirty="0"/>
+                <a:t>a</a:t>
+              </a:r>
+              <a:r>
+                <a:rPr lang="en-US" altLang="zh-TW" dirty="0" smtClean="0"/>
+                <a:t>nnotation</a:t>
+              </a:r>
+              <a:endParaRPr lang="zh-TW" altLang="en-US" dirty="0"/>
+            </a:p>
+          </p:txBody>
+        </p:sp>
+        <p:sp>
+          <p:nvSpPr>
+            <p:cNvPr id="13" name="圓角矩形 12"/>
+            <p:cNvSpPr/>
+            <p:nvPr/>
+          </p:nvSpPr>
+          <p:spPr>
+            <a:xfrm>
+              <a:off x="3316776" y="1645919"/>
+              <a:ext cx="2676699" cy="257695"/>
+            </a:xfrm>
+            <a:prstGeom prst="roundRect">
+              <a:avLst/>
+            </a:prstGeom>
+            <a:solidFill>
+              <a:schemeClr val="accent1">
+                <a:lumMod val="60000"/>
+                <a:lumOff val="40000"/>
+              </a:schemeClr>
+            </a:solidFill>
+            <a:ln>
+              <a:noFill/>
+            </a:ln>
+          </p:spPr>
+          <p:style>
+            <a:lnRef idx="2">
+              <a:schemeClr val="accent1">
+                <a:shade val="50000"/>
+              </a:schemeClr>
+            </a:lnRef>
+            <a:fillRef idx="1">
+              <a:schemeClr val="accent1"/>
+            </a:fillRef>
+            <a:effectRef idx="0">
+              <a:schemeClr val="accent1"/>
+            </a:effectRef>
+            <a:fontRef idx="minor">
+              <a:schemeClr val="lt1"/>
+            </a:fontRef>
+          </p:style>
+          <p:txBody>
+            <a:bodyPr rtlCol="0" anchor="ctr"/>
+            <a:lstStyle/>
+            <a:p>
+              <a:pPr algn="ctr"/>
+              <a:r>
+                <a:rPr lang="en-US" altLang="zh-TW" dirty="0" smtClean="0"/>
+                <a:t>preprocess</a:t>
+              </a:r>
+              <a:endParaRPr lang="zh-TW" altLang="en-US" dirty="0"/>
+            </a:p>
+          </p:txBody>
+        </p:sp>
+        <p:sp>
+          <p:nvSpPr>
+            <p:cNvPr id="14" name="圓角矩形 13"/>
+            <p:cNvSpPr/>
+            <p:nvPr/>
+          </p:nvSpPr>
+          <p:spPr>
+            <a:xfrm>
+              <a:off x="4247804" y="2062140"/>
+              <a:ext cx="2614351" cy="257695"/>
+            </a:xfrm>
+            <a:prstGeom prst="roundRect">
+              <a:avLst/>
+            </a:prstGeom>
+            <a:solidFill>
+              <a:schemeClr val="accent1">
+                <a:lumMod val="60000"/>
+                <a:lumOff val="40000"/>
+              </a:schemeClr>
+            </a:solidFill>
+            <a:ln>
+              <a:noFill/>
+            </a:ln>
+          </p:spPr>
+          <p:style>
+            <a:lnRef idx="2">
+              <a:schemeClr val="accent1">
+                <a:shade val="50000"/>
+              </a:schemeClr>
+            </a:lnRef>
+            <a:fillRef idx="1">
+              <a:schemeClr val="accent1"/>
+            </a:fillRef>
+            <a:effectRef idx="0">
+              <a:schemeClr val="accent1"/>
+            </a:effectRef>
+            <a:fontRef idx="minor">
+              <a:schemeClr val="lt1"/>
+            </a:fontRef>
+          </p:style>
+          <p:txBody>
+            <a:bodyPr rtlCol="0" anchor="ctr"/>
+            <a:lstStyle/>
+            <a:p>
+              <a:pPr algn="ctr"/>
+              <a:r>
+                <a:rPr lang="en-US" altLang="zh-TW" dirty="0"/>
+                <a:t>b</a:t>
+              </a:r>
+              <a:r>
+                <a:rPr lang="en-US" altLang="zh-TW" dirty="0" smtClean="0"/>
+                <a:t>uild classifier</a:t>
+              </a:r>
+              <a:endParaRPr lang="zh-TW" altLang="en-US" dirty="0"/>
+            </a:p>
+          </p:txBody>
+        </p:sp>
+        <p:sp>
+          <p:nvSpPr>
+            <p:cNvPr id="15" name="圓角矩形 14"/>
+            <p:cNvSpPr/>
+            <p:nvPr/>
+          </p:nvSpPr>
+          <p:spPr>
+            <a:xfrm>
+              <a:off x="5124795" y="2477191"/>
+              <a:ext cx="1737360" cy="257695"/>
+            </a:xfrm>
+            <a:prstGeom prst="roundRect">
+              <a:avLst/>
+            </a:prstGeom>
+            <a:solidFill>
+              <a:schemeClr val="accent1">
+                <a:lumMod val="60000"/>
+                <a:lumOff val="40000"/>
+              </a:schemeClr>
+            </a:solidFill>
+            <a:ln>
+              <a:noFill/>
+            </a:ln>
+          </p:spPr>
+          <p:style>
+            <a:lnRef idx="2">
+              <a:schemeClr val="accent1">
+                <a:shade val="50000"/>
+              </a:schemeClr>
+            </a:lnRef>
+            <a:fillRef idx="1">
+              <a:schemeClr val="accent1"/>
+            </a:fillRef>
+            <a:effectRef idx="0">
+              <a:schemeClr val="accent1"/>
+            </a:effectRef>
+            <a:fontRef idx="minor">
+              <a:schemeClr val="lt1"/>
+            </a:fontRef>
+          </p:style>
+          <p:txBody>
+            <a:bodyPr rtlCol="0" anchor="ctr"/>
+            <a:lstStyle/>
+            <a:p>
+              <a:pPr algn="ctr"/>
+              <a:r>
+                <a:rPr lang="en-US" altLang="zh-TW" dirty="0"/>
+                <a:t>t</a:t>
+              </a:r>
+              <a:r>
+                <a:rPr lang="en-US" altLang="zh-TW" dirty="0" smtClean="0"/>
+                <a:t>est classifier</a:t>
+              </a:r>
+              <a:endParaRPr lang="zh-TW" altLang="en-US" dirty="0"/>
+            </a:p>
+          </p:txBody>
+        </p:sp>
+        <p:sp>
+          <p:nvSpPr>
+            <p:cNvPr id="16" name="圓角矩形 15"/>
+            <p:cNvSpPr/>
+            <p:nvPr/>
+          </p:nvSpPr>
+          <p:spPr>
+            <a:xfrm>
+              <a:off x="4946071" y="3516283"/>
+              <a:ext cx="1853738" cy="257695"/>
+            </a:xfrm>
+            <a:prstGeom prst="roundRect">
+              <a:avLst/>
+            </a:prstGeom>
+            <a:solidFill>
+              <a:schemeClr val="accent2">
+                <a:lumMod val="60000"/>
+                <a:lumOff val="40000"/>
+              </a:schemeClr>
+            </a:solidFill>
+            <a:ln>
+              <a:noFill/>
+            </a:ln>
+          </p:spPr>
+          <p:style>
+            <a:lnRef idx="2">
+              <a:schemeClr val="accent1">
+                <a:shade val="50000"/>
+              </a:schemeClr>
+            </a:lnRef>
+            <a:fillRef idx="1">
+              <a:schemeClr val="accent1"/>
+            </a:fillRef>
+            <a:effectRef idx="0">
+              <a:schemeClr val="accent1"/>
+            </a:effectRef>
+            <a:fontRef idx="minor">
+              <a:schemeClr val="lt1"/>
+            </a:fontRef>
+          </p:style>
+          <p:txBody>
+            <a:bodyPr rtlCol="0" anchor="ctr"/>
+            <a:lstStyle/>
+            <a:p>
+              <a:pPr algn="ctr"/>
+              <a:r>
+                <a:rPr lang="en-US" altLang="zh-TW" dirty="0"/>
+                <a:t>b</a:t>
+              </a:r>
+              <a:r>
+                <a:rPr lang="en-US" altLang="zh-TW" dirty="0" smtClean="0"/>
+                <a:t>uild CLI app</a:t>
+              </a:r>
+              <a:endParaRPr lang="zh-TW" altLang="en-US" dirty="0"/>
+            </a:p>
+          </p:txBody>
+        </p:sp>
+        <p:sp>
+          <p:nvSpPr>
+            <p:cNvPr id="17" name="圓角矩形 16"/>
+            <p:cNvSpPr/>
+            <p:nvPr/>
+          </p:nvSpPr>
+          <p:spPr>
+            <a:xfrm>
+              <a:off x="5902035" y="3940232"/>
+              <a:ext cx="1737361" cy="257695"/>
+            </a:xfrm>
+            <a:prstGeom prst="roundRect">
+              <a:avLst/>
+            </a:prstGeom>
+            <a:solidFill>
+              <a:schemeClr val="accent2">
+                <a:lumMod val="60000"/>
+                <a:lumOff val="40000"/>
+              </a:schemeClr>
+            </a:solidFill>
+            <a:ln>
+              <a:noFill/>
+            </a:ln>
+          </p:spPr>
+          <p:style>
+            <a:lnRef idx="2">
+              <a:schemeClr val="accent1">
+                <a:shade val="50000"/>
+              </a:schemeClr>
+            </a:lnRef>
+            <a:fillRef idx="1">
+              <a:schemeClr val="accent1"/>
+            </a:fillRef>
+            <a:effectRef idx="0">
+              <a:schemeClr val="accent1"/>
+            </a:effectRef>
+            <a:fontRef idx="minor">
+              <a:schemeClr val="lt1"/>
+            </a:fontRef>
+          </p:style>
+          <p:txBody>
+            <a:bodyPr rtlCol="0" anchor="ctr"/>
+            <a:lstStyle/>
+            <a:p>
+              <a:pPr algn="ctr"/>
+              <a:r>
+                <a:rPr lang="en-US" altLang="zh-TW" dirty="0" smtClean="0"/>
+                <a:t>test CLI app</a:t>
+              </a:r>
+              <a:endParaRPr lang="zh-TW" altLang="en-US" dirty="0"/>
+            </a:p>
+          </p:txBody>
+        </p:sp>
+        <p:sp>
+          <p:nvSpPr>
+            <p:cNvPr id="18" name="圓角矩形 17"/>
+            <p:cNvSpPr/>
+            <p:nvPr/>
+          </p:nvSpPr>
+          <p:spPr>
+            <a:xfrm>
+              <a:off x="6716684" y="4364181"/>
+              <a:ext cx="1687483" cy="257695"/>
+            </a:xfrm>
+            <a:prstGeom prst="roundRect">
+              <a:avLst/>
+            </a:prstGeom>
+            <a:solidFill>
+              <a:schemeClr val="accent2">
+                <a:lumMod val="60000"/>
+                <a:lumOff val="40000"/>
+              </a:schemeClr>
+            </a:solidFill>
+            <a:ln>
+              <a:noFill/>
+            </a:ln>
+          </p:spPr>
+          <p:style>
+            <a:lnRef idx="2">
+              <a:schemeClr val="accent1">
+                <a:shade val="50000"/>
+              </a:schemeClr>
+            </a:lnRef>
+            <a:fillRef idx="1">
+              <a:schemeClr val="accent1"/>
+            </a:fillRef>
+            <a:effectRef idx="0">
+              <a:schemeClr val="accent1"/>
+            </a:effectRef>
+            <a:fontRef idx="minor">
+              <a:schemeClr val="lt1"/>
+            </a:fontRef>
+          </p:style>
+          <p:txBody>
+            <a:bodyPr rtlCol="0" anchor="ctr"/>
+            <a:lstStyle/>
+            <a:p>
+              <a:pPr algn="ctr"/>
+              <a:r>
+                <a:rPr lang="en-US" altLang="zh-TW" dirty="0"/>
+                <a:t>a</a:t>
+              </a:r>
+              <a:r>
+                <a:rPr lang="en-US" altLang="zh-TW" dirty="0" smtClean="0"/>
+                <a:t>dd function</a:t>
+              </a:r>
+              <a:endParaRPr lang="zh-TW" altLang="en-US" dirty="0"/>
+            </a:p>
+          </p:txBody>
+        </p:sp>
+        <p:sp>
+          <p:nvSpPr>
+            <p:cNvPr id="19" name="圓角矩形 18"/>
+            <p:cNvSpPr/>
+            <p:nvPr/>
+          </p:nvSpPr>
+          <p:spPr>
+            <a:xfrm>
+              <a:off x="7888776" y="4971010"/>
+              <a:ext cx="1853738" cy="257695"/>
+            </a:xfrm>
+            <a:prstGeom prst="roundRect">
+              <a:avLst/>
+            </a:prstGeom>
+            <a:solidFill>
+              <a:schemeClr val="accent4">
+                <a:lumMod val="60000"/>
+                <a:lumOff val="40000"/>
+              </a:schemeClr>
+            </a:solidFill>
+            <a:ln>
+              <a:noFill/>
+            </a:ln>
+          </p:spPr>
+          <p:style>
+            <a:lnRef idx="2">
+              <a:schemeClr val="accent1">
+                <a:shade val="50000"/>
+              </a:schemeClr>
+            </a:lnRef>
+            <a:fillRef idx="1">
+              <a:schemeClr val="accent1"/>
+            </a:fillRef>
+            <a:effectRef idx="0">
+              <a:schemeClr val="accent1"/>
+            </a:effectRef>
+            <a:fontRef idx="minor">
+              <a:schemeClr val="lt1"/>
+            </a:fontRef>
+          </p:style>
+          <p:txBody>
+            <a:bodyPr rtlCol="0" anchor="ctr"/>
+            <a:lstStyle/>
+            <a:p>
+              <a:pPr algn="ctr"/>
+              <a:r>
+                <a:rPr lang="en-US" altLang="zh-TW" dirty="0"/>
+                <a:t>b</a:t>
+              </a:r>
+              <a:r>
+                <a:rPr lang="en-US" altLang="zh-TW" dirty="0" smtClean="0"/>
+                <a:t>uild WEB API</a:t>
+              </a:r>
+              <a:endParaRPr lang="zh-TW" altLang="en-US" dirty="0"/>
+            </a:p>
+          </p:txBody>
+        </p:sp>
+        <p:sp>
+          <p:nvSpPr>
+            <p:cNvPr id="20" name="圓角矩形 19"/>
+            <p:cNvSpPr/>
+            <p:nvPr/>
+          </p:nvSpPr>
+          <p:spPr>
+            <a:xfrm>
+              <a:off x="8404168" y="5394959"/>
+              <a:ext cx="2177934" cy="257695"/>
+            </a:xfrm>
+            <a:prstGeom prst="roundRect">
+              <a:avLst/>
+            </a:prstGeom>
+            <a:solidFill>
+              <a:schemeClr val="accent4">
+                <a:lumMod val="60000"/>
+                <a:lumOff val="40000"/>
+              </a:schemeClr>
+            </a:solidFill>
+            <a:ln>
+              <a:noFill/>
+            </a:ln>
+          </p:spPr>
+          <p:style>
+            <a:lnRef idx="2">
+              <a:schemeClr val="accent1">
+                <a:shade val="50000"/>
+              </a:schemeClr>
+            </a:lnRef>
+            <a:fillRef idx="1">
+              <a:schemeClr val="accent1"/>
+            </a:fillRef>
+            <a:effectRef idx="0">
+              <a:schemeClr val="accent1"/>
+            </a:effectRef>
+            <a:fontRef idx="minor">
+              <a:schemeClr val="lt1"/>
+            </a:fontRef>
+          </p:style>
+          <p:txBody>
+            <a:bodyPr rtlCol="0" anchor="ctr"/>
+            <a:lstStyle/>
+            <a:p>
+              <a:pPr algn="ctr"/>
+              <a:r>
+                <a:rPr lang="en-US" altLang="zh-TW" dirty="0" smtClean="0"/>
+                <a:t>build WEB interface</a:t>
+              </a:r>
+              <a:endParaRPr lang="zh-TW" altLang="en-US" dirty="0"/>
+            </a:p>
+          </p:txBody>
+        </p:sp>
+        <p:sp>
+          <p:nvSpPr>
+            <p:cNvPr id="21" name="圓角矩形 20"/>
+            <p:cNvSpPr/>
+            <p:nvPr/>
+          </p:nvSpPr>
+          <p:spPr>
+            <a:xfrm>
+              <a:off x="9285317" y="5818908"/>
+              <a:ext cx="2061556" cy="257695"/>
+            </a:xfrm>
+            <a:prstGeom prst="roundRect">
+              <a:avLst/>
+            </a:prstGeom>
+            <a:solidFill>
+              <a:schemeClr val="accent4">
+                <a:lumMod val="60000"/>
+                <a:lumOff val="40000"/>
+              </a:schemeClr>
+            </a:solidFill>
+            <a:ln>
+              <a:noFill/>
+            </a:ln>
+          </p:spPr>
+          <p:style>
+            <a:lnRef idx="2">
+              <a:schemeClr val="accent1">
+                <a:shade val="50000"/>
+              </a:schemeClr>
+            </a:lnRef>
+            <a:fillRef idx="1">
+              <a:schemeClr val="accent1"/>
+            </a:fillRef>
+            <a:effectRef idx="0">
+              <a:schemeClr val="accent1"/>
+            </a:effectRef>
+            <a:fontRef idx="minor">
+              <a:schemeClr val="lt1"/>
+            </a:fontRef>
+          </p:style>
+          <p:txBody>
+            <a:bodyPr rtlCol="0" anchor="ctr"/>
+            <a:lstStyle/>
+            <a:p>
+              <a:pPr algn="ctr"/>
+              <a:r>
+                <a:rPr lang="en-US" altLang="zh-TW" dirty="0"/>
+                <a:t>t</a:t>
+              </a:r>
+              <a:r>
+                <a:rPr lang="en-US" altLang="zh-TW" dirty="0" smtClean="0"/>
+                <a:t>est WEB app</a:t>
+              </a:r>
+              <a:endParaRPr lang="zh-TW" altLang="en-US" dirty="0"/>
+            </a:p>
+          </p:txBody>
+        </p:sp>
+        <p:sp>
+          <p:nvSpPr>
+            <p:cNvPr id="22" name="圓角矩形 21"/>
+            <p:cNvSpPr/>
+            <p:nvPr/>
+          </p:nvSpPr>
+          <p:spPr>
+            <a:xfrm>
+              <a:off x="6862155" y="2892242"/>
+              <a:ext cx="2298470" cy="257695"/>
+            </a:xfrm>
+            <a:prstGeom prst="roundRect">
+              <a:avLst/>
+            </a:prstGeom>
+            <a:solidFill>
+              <a:schemeClr val="accent1">
+                <a:lumMod val="60000"/>
+                <a:lumOff val="40000"/>
+              </a:schemeClr>
+            </a:solidFill>
+            <a:ln>
+              <a:noFill/>
+            </a:ln>
+          </p:spPr>
+          <p:style>
+            <a:lnRef idx="2">
+              <a:schemeClr val="accent1">
+                <a:shade val="50000"/>
+              </a:schemeClr>
+            </a:lnRef>
+            <a:fillRef idx="1">
+              <a:schemeClr val="accent1"/>
+            </a:fillRef>
+            <a:effectRef idx="0">
+              <a:schemeClr val="accent1"/>
+            </a:effectRef>
+            <a:fontRef idx="minor">
+              <a:schemeClr val="lt1"/>
+            </a:fontRef>
+          </p:style>
+          <p:txBody>
+            <a:bodyPr rtlCol="0" anchor="ctr"/>
+            <a:lstStyle/>
+            <a:p>
+              <a:pPr algn="ctr"/>
+              <a:r>
+                <a:rPr lang="en-US" altLang="zh-TW" dirty="0" smtClean="0"/>
+                <a:t>modify classifier</a:t>
+              </a:r>
+              <a:endParaRPr lang="zh-TW" altLang="en-US" dirty="0"/>
+            </a:p>
+          </p:txBody>
+        </p:sp>
+      </p:grpSp>
+    </p:spTree>
+    <p:extLst>
+      <p:ext uri="{BB962C8B-B14F-4D97-AF65-F5344CB8AC3E}">
+        <p14:creationId xmlns:p14="http://schemas.microsoft.com/office/powerpoint/2010/main" val="2942857617"/>
+      </p:ext>
+    </p:extLst>
+  </p:cSld>
+  <p:clrMapOvr>
+    <a:masterClrMapping/>
+  </p:clrMapOvr>
+</p:sld>
+</file>
+
+<file path=ppt/slides/slide16.xml><?xml version="1.0" encoding="utf-8"?>
+<p:sld xmlns:a="http://schemas.openxmlformats.org/drawingml/2006/main" xmlns:r="http://schemas.openxmlformats.org/officeDocument/2006/relationships" xmlns:p="http://schemas.openxmlformats.org/presentationml/2006/main">
+  <p:cSld>
+    <p:spTree>
+      <p:nvGrpSpPr>
+        <p:cNvPr id="1" name=""/>
+        <p:cNvGrpSpPr/>
+        <p:nvPr/>
+      </p:nvGrpSpPr>
+      <p:grpSpPr>
+        <a:xfrm>
+          <a:off x="0" y="0"/>
+          <a:ext cx="0" cy="0"/>
+          <a:chOff x="0" y="0"/>
+          <a:chExt cx="0" cy="0"/>
+        </a:xfrm>
+      </p:grpSpPr>
+      <p:sp>
+        <p:nvSpPr>
+          <p:cNvPr id="4" name="日期版面配置區 3"/>
+          <p:cNvSpPr>
+            <a:spLocks noGrp="1"/>
+          </p:cNvSpPr>
+          <p:nvPr>
+            <p:ph type="dt" sz="half" idx="10"/>
+          </p:nvPr>
+        </p:nvSpPr>
+        <p:spPr/>
+        <p:txBody>
+          <a:bodyPr/>
+          <a:lstStyle/>
+          <a:p>
             <a:fld id="{E87FB235-A134-4E58-BB66-40A6F5BBA222}" type="datetime1">
               <a:rPr lang="en-US" altLang="zh-TW" smtClean="0"/>
               <a:t>8/4/2021</a:t>
@@ -10886,7 +11968,7 @@
             <a:fld id="{8A7A6979-0714-4377-B894-6BE4C2D6E202}" type="slidenum">
               <a:rPr lang="en-US" smtClean="0"/>
               <a:pPr/>
-              <a:t>15</a:t>
+              <a:t>16</a:t>
             </a:fld>
             <a:endParaRPr lang="en-US" dirty="0"/>
           </a:p>

</xml_diff>